<commit_message>
Vortrag aufgepeppt mit Bildern.
</commit_message>
<xml_diff>
--- a/vortrag.pptx
+++ b/vortrag.pptx
@@ -1373,6 +1373,91 @@
     <p:extLst>
       <p:ext uri="{BB962C8B-B14F-4D97-AF65-F5344CB8AC3E}">
         <p14:creationId xmlns:p14="http://schemas.microsoft.com/office/powerpoint/2010/main" val="3886376919"/>
+      </p:ext>
+    </p:extLst>
+  </p:cSld>
+  <p:clrMapOvr>
+    <a:masterClrMapping/>
+  </p:clrMapOvr>
+</p:notes>
+</file>
+
+<file path=ppt/notesSlides/notesSlide6.xml><?xml version="1.0" encoding="utf-8"?>
+<p:notes xmlns:a="http://schemas.openxmlformats.org/drawingml/2006/main" xmlns:r="http://schemas.openxmlformats.org/officeDocument/2006/relationships" xmlns:p="http://schemas.openxmlformats.org/presentationml/2006/main">
+  <p:cSld>
+    <p:spTree>
+      <p:nvGrpSpPr>
+        <p:cNvPr id="1" name=""/>
+        <p:cNvGrpSpPr/>
+        <p:nvPr/>
+      </p:nvGrpSpPr>
+      <p:grpSpPr>
+        <a:xfrm>
+          <a:off x="0" y="0"/>
+          <a:ext cx="0" cy="0"/>
+          <a:chOff x="0" y="0"/>
+          <a:chExt cx="0" cy="0"/>
+        </a:xfrm>
+      </p:grpSpPr>
+      <p:sp>
+        <p:nvSpPr>
+          <p:cNvPr id="2" name="Folienbildplatzhalter 1"/>
+          <p:cNvSpPr>
+            <a:spLocks noGrp="1" noRot="1" noChangeAspect="1"/>
+          </p:cNvSpPr>
+          <p:nvPr>
+            <p:ph type="sldImg"/>
+          </p:nvPr>
+        </p:nvSpPr>
+        <p:spPr/>
+      </p:sp>
+      <p:sp>
+        <p:nvSpPr>
+          <p:cNvPr id="3" name="Notizenplatzhalter 2"/>
+          <p:cNvSpPr>
+            <a:spLocks noGrp="1"/>
+          </p:cNvSpPr>
+          <p:nvPr>
+            <p:ph type="body" idx="1"/>
+          </p:nvPr>
+        </p:nvSpPr>
+        <p:spPr/>
+        <p:txBody>
+          <a:bodyPr/>
+          <a:lstStyle/>
+          <a:p>
+            <a:endParaRPr lang="de-DE" dirty="0"/>
+          </a:p>
+        </p:txBody>
+      </p:sp>
+      <p:sp>
+        <p:nvSpPr>
+          <p:cNvPr id="4" name="Foliennummernplatzhalter 3"/>
+          <p:cNvSpPr>
+            <a:spLocks noGrp="1"/>
+          </p:cNvSpPr>
+          <p:nvPr>
+            <p:ph type="sldNum" sz="quarter" idx="10"/>
+          </p:nvPr>
+        </p:nvSpPr>
+        <p:spPr/>
+        <p:txBody>
+          <a:bodyPr/>
+          <a:lstStyle/>
+          <a:p>
+            <a:fld id="{E4AA6088-1FF0-4E53-845C-EFEDD1C948F8}" type="slidenum">
+              <a:rPr lang="de-DE" smtClean="0"/>
+              <a:pPr/>
+              <a:t>12</a:t>
+            </a:fld>
+            <a:endParaRPr lang="de-DE"/>
+          </a:p>
+        </p:txBody>
+      </p:sp>
+    </p:spTree>
+    <p:extLst>
+      <p:ext uri="{BB962C8B-B14F-4D97-AF65-F5344CB8AC3E}">
+        <p14:creationId xmlns:p14="http://schemas.microsoft.com/office/powerpoint/2010/main" val="1435110845"/>
       </p:ext>
     </p:extLst>
   </p:cSld>
@@ -3330,7 +3415,7 @@
                   </a:schemeClr>
                 </a:solidFill>
               </a:rPr>
-              <a:t>Typescript</a:t>
+              <a:t>TypeScript</a:t>
             </a:r>
             <a:endParaRPr lang="de-DE" dirty="0">
               <a:solidFill>
@@ -3508,53 +3593,168 @@
           <a:bodyPr/>
           <a:lstStyle/>
           <a:p>
-            <a:pPr marL="285750" indent="-285750">
-              <a:buFont typeface="Wingdings" panose="05000000000000000000" pitchFamily="2" charset="2"/>
-              <a:buChar char="§"/>
-            </a:pPr>
+            <a:pPr marL="647700" lvl="2" indent="-285750"/>
             <a:r>
               <a:rPr lang="de-DE" dirty="0"/>
               <a:t>Schnelle, reaktive Anwendung</a:t>
             </a:r>
           </a:p>
           <a:p>
-            <a:pPr marL="285750" indent="-285750">
-              <a:buFont typeface="Wingdings" panose="05000000000000000000" pitchFamily="2" charset="2"/>
-              <a:buChar char="§"/>
-            </a:pPr>
+            <a:pPr marL="647700" lvl="2" indent="-285750"/>
             <a:r>
               <a:rPr lang="de-DE" dirty="0"/>
               <a:t>Besserer Überblick</a:t>
             </a:r>
           </a:p>
           <a:p>
-            <a:pPr marL="285750" indent="-285750">
-              <a:buFont typeface="Wingdings" panose="05000000000000000000" pitchFamily="2" charset="2"/>
-              <a:buChar char="§"/>
-            </a:pPr>
-            <a:r>
-              <a:rPr lang="de-DE" dirty="0"/>
-              <a:t>Einfach erweiterbar</a:t>
-            </a:r>
-          </a:p>
-          <a:p>
-            <a:pPr marL="285750" indent="-285750">
-              <a:buFont typeface="Wingdings" panose="05000000000000000000" pitchFamily="2" charset="2"/>
-              <a:buChar char="§"/>
-            </a:pPr>
+            <a:pPr marL="647700" lvl="2" indent="-285750"/>
+            <a:r>
+              <a:rPr lang="de-DE" dirty="0"/>
+              <a:t>Hilfreiche Filterfunktionen</a:t>
+            </a:r>
+          </a:p>
+          <a:p>
+            <a:pPr marL="647700" lvl="2" indent="-285750"/>
+            <a:r>
+              <a:rPr lang="de-DE" dirty="0"/>
+              <a:t>Einfach erweiterbar, </a:t>
+            </a:r>
+            <a:r>
+              <a:rPr lang="de-DE" dirty="0" err="1"/>
+              <a:t>z.B</a:t>
+            </a:r>
+            <a:r>
+              <a:rPr lang="de-DE" dirty="0"/>
+              <a:t>:</a:t>
+            </a:r>
+          </a:p>
+          <a:p>
+            <a:pPr marL="828675" lvl="3" indent="-285750"/>
             <a:r>
               <a:rPr lang="de-DE" dirty="0"/>
               <a:t>GPU-Cluster Anbindung</a:t>
             </a:r>
           </a:p>
           <a:p>
-            <a:pPr marL="285750" indent="-285750">
-              <a:buFont typeface="Wingdings" panose="05000000000000000000" pitchFamily="2" charset="2"/>
-              <a:buChar char="§"/>
-            </a:pPr>
+            <a:pPr marL="828675" lvl="3" indent="-285750"/>
             <a:r>
               <a:rPr lang="de-DE" dirty="0"/>
               <a:t>Metastudien</a:t>
+            </a:r>
+          </a:p>
+        </p:txBody>
+      </p:sp>
+      <p:pic>
+        <p:nvPicPr>
+          <p:cNvPr id="2" name="Grafik 1">
+            <a:extLst>
+              <a:ext uri="{FF2B5EF4-FFF2-40B4-BE49-F238E27FC236}">
+                <a16:creationId xmlns:a16="http://schemas.microsoft.com/office/drawing/2014/main" id="{D44C7EAC-8742-4D23-8804-EAE45B09B903}"/>
+              </a:ext>
+            </a:extLst>
+          </p:cNvPr>
+          <p:cNvPicPr>
+            <a:picLocks noChangeAspect="1"/>
+          </p:cNvPicPr>
+          <p:nvPr/>
+        </p:nvPicPr>
+        <p:blipFill>
+          <a:blip r:embed="rId3"/>
+          <a:stretch>
+            <a:fillRect/>
+          </a:stretch>
+        </p:blipFill>
+        <p:spPr>
+          <a:xfrm>
+            <a:off x="3603404" y="2797305"/>
+            <a:ext cx="5292788" cy="2577940"/>
+          </a:xfrm>
+          <a:prstGeom prst="rect">
+            <a:avLst/>
+          </a:prstGeom>
+          <a:ln>
+            <a:noFill/>
+          </a:ln>
+          <a:effectLst>
+            <a:outerShdw blurRad="292100" dist="139700" dir="2700000" algn="tl" rotWithShape="0">
+              <a:srgbClr val="333333">
+                <a:alpha val="65000"/>
+              </a:srgbClr>
+            </a:outerShdw>
+            <a:reflection blurRad="6350" stA="52000" endA="300" endPos="35000" dir="5400000" sy="-100000" algn="bl" rotWithShape="0"/>
+          </a:effectLst>
+        </p:spPr>
+      </p:pic>
+      <p:pic>
+        <p:nvPicPr>
+          <p:cNvPr id="6" name="Grafik 5" descr="Daumen hoch">
+            <a:extLst>
+              <a:ext uri="{FF2B5EF4-FFF2-40B4-BE49-F238E27FC236}">
+                <a16:creationId xmlns:a16="http://schemas.microsoft.com/office/drawing/2014/main" id="{BC230D53-E95C-4A29-94DE-8935383D5E56}"/>
+              </a:ext>
+            </a:extLst>
+          </p:cNvPr>
+          <p:cNvPicPr>
+            <a:picLocks noChangeAspect="1"/>
+          </p:cNvPicPr>
+          <p:nvPr/>
+        </p:nvPicPr>
+        <p:blipFill>
+          <a:blip r:embed="rId4">
+            <a:extLst>
+              <a:ext uri="{28A0092B-C50C-407E-A947-70E740481C1C}">
+                <a14:useLocalDpi xmlns:a14="http://schemas.microsoft.com/office/drawing/2010/main" val="0"/>
+              </a:ext>
+              <a:ext uri="{96DAC541-7B7A-43D3-8B79-37D633B846F1}">
+                <asvg:svgBlip xmlns:asvg="http://schemas.microsoft.com/office/drawing/2016/SVG/main" r:embed="rId5"/>
+              </a:ext>
+            </a:extLst>
+          </a:blip>
+          <a:stretch>
+            <a:fillRect/>
+          </a:stretch>
+        </p:blipFill>
+        <p:spPr>
+          <a:xfrm>
+            <a:off x="704802" y="3568768"/>
+            <a:ext cx="1739817" cy="1739817"/>
+          </a:xfrm>
+          <a:prstGeom prst="rect">
+            <a:avLst/>
+          </a:prstGeom>
+        </p:spPr>
+      </p:pic>
+      <p:sp>
+        <p:nvSpPr>
+          <p:cNvPr id="11" name="Textfeld 10">
+            <a:extLst>
+              <a:ext uri="{FF2B5EF4-FFF2-40B4-BE49-F238E27FC236}">
+                <a16:creationId xmlns:a16="http://schemas.microsoft.com/office/drawing/2014/main" id="{C3FA7332-3BBC-4E17-9165-4AC558612A7A}"/>
+              </a:ext>
+            </a:extLst>
+          </p:cNvPr>
+          <p:cNvSpPr txBox="1"/>
+          <p:nvPr/>
+        </p:nvSpPr>
+        <p:spPr>
+          <a:xfrm>
+            <a:off x="8807450" y="5375245"/>
+            <a:ext cx="312906" cy="184666"/>
+          </a:xfrm>
+          <a:prstGeom prst="rect">
+            <a:avLst/>
+          </a:prstGeom>
+          <a:noFill/>
+        </p:spPr>
+        <p:txBody>
+          <a:bodyPr wrap="none" rtlCol="0">
+            <a:spAutoFit/>
+          </a:bodyPr>
+          <a:lstStyle/>
+          <a:p>
+            <a:r>
+              <a:rPr lang="de-DE" sz="600" dirty="0"/>
+              <a:t>[13]</a:t>
             </a:r>
           </a:p>
         </p:txBody>
@@ -3637,7 +3837,7 @@
           <a:p>
             <a:r>
               <a:rPr lang="de-DE" dirty="0"/>
-              <a:t>Literaturverzeichnis</a:t>
+              <a:t>Quellen</a:t>
             </a:r>
           </a:p>
         </p:txBody>
@@ -3662,6 +3862,176 @@
         <p:txBody>
           <a:bodyPr/>
           <a:lstStyle/>
+          <a:p>
+            <a:r>
+              <a:rPr lang="de-DE" dirty="0"/>
+              <a:t>[1] unübersichtliche Ordnerstruktur – erstellt von Lukas Güldenhaupt</a:t>
+            </a:r>
+          </a:p>
+          <a:p>
+            <a:r>
+              <a:rPr lang="de-DE" dirty="0"/>
+              <a:t>[2] vom Chaos zur Ordnung – erstellt von Lukas Güldenhaupt</a:t>
+            </a:r>
+          </a:p>
+          <a:p>
+            <a:r>
+              <a:rPr lang="de-DE" dirty="0"/>
+              <a:t>[3] JavaScript Logo – </a:t>
+            </a:r>
+            <a:r>
+              <a:rPr lang="de-DE" dirty="0">
+                <a:hlinkClick r:id="rId2"/>
+              </a:rPr>
+              <a:t>https://commons.wikimedia.org/wiki/File:JavaScript-logo.png</a:t>
+            </a:r>
+            <a:r>
+              <a:rPr lang="de-DE" dirty="0"/>
+              <a:t> </a:t>
+            </a:r>
+          </a:p>
+          <a:p>
+            <a:r>
+              <a:rPr lang="de-DE" dirty="0"/>
+              <a:t>[4] </a:t>
+            </a:r>
+            <a:r>
+              <a:rPr lang="de-DE" dirty="0" err="1"/>
+              <a:t>TypeScript</a:t>
+            </a:r>
+            <a:r>
+              <a:rPr lang="de-DE" dirty="0"/>
+              <a:t> Logo - </a:t>
+            </a:r>
+            <a:r>
+              <a:rPr lang="de-DE" dirty="0">
+                <a:hlinkClick r:id="rId3"/>
+              </a:rPr>
+              <a:t>https://github.com/Microsoft/TypeScript/blob/master/doc/logo.svg</a:t>
+            </a:r>
+            <a:endParaRPr lang="de-DE" dirty="0"/>
+          </a:p>
+          <a:p>
+            <a:r>
+              <a:rPr lang="de-DE" dirty="0"/>
+              <a:t>[5] Java Logo - </a:t>
+            </a:r>
+            <a:r>
+              <a:rPr lang="de-DE" dirty="0">
+                <a:hlinkClick r:id="rId4"/>
+              </a:rPr>
+              <a:t>https://blog.newrelic.com/2014/04/04/java-developers-to-follow/</a:t>
+            </a:r>
+            <a:endParaRPr lang="de-DE" dirty="0"/>
+          </a:p>
+          <a:p>
+            <a:r>
+              <a:rPr lang="de-DE" dirty="0"/>
+              <a:t>[6] Codevergleich (JavaScript, </a:t>
+            </a:r>
+            <a:r>
+              <a:rPr lang="de-DE" dirty="0" err="1"/>
+              <a:t>TypeScript</a:t>
+            </a:r>
+            <a:r>
+              <a:rPr lang="de-DE" dirty="0"/>
+              <a:t>, Java) – erstellt von Lukas Güldenhaupt</a:t>
+            </a:r>
+          </a:p>
+          <a:p>
+            <a:r>
+              <a:rPr lang="de-DE" dirty="0"/>
+              <a:t>[7] </a:t>
+            </a:r>
+            <a:r>
+              <a:rPr lang="de-DE" dirty="0" err="1"/>
+              <a:t>NodeJS</a:t>
+            </a:r>
+            <a:r>
+              <a:rPr lang="de-DE" dirty="0"/>
+              <a:t> Logo – </a:t>
+            </a:r>
+            <a:r>
+              <a:rPr lang="de-DE" dirty="0">
+                <a:hlinkClick r:id="rId5"/>
+              </a:rPr>
+              <a:t>https://nodejs.org/en/</a:t>
+            </a:r>
+            <a:r>
+              <a:rPr lang="de-DE" dirty="0"/>
+              <a:t> </a:t>
+            </a:r>
+          </a:p>
+          <a:p>
+            <a:r>
+              <a:rPr lang="de-DE" dirty="0"/>
+              <a:t>[8] Meteor Logo - </a:t>
+            </a:r>
+            <a:r>
+              <a:rPr lang="de-DE" dirty="0">
+                <a:hlinkClick r:id="rId6"/>
+              </a:rPr>
+              <a:t>https://www.meteor.com/</a:t>
+            </a:r>
+            <a:r>
+              <a:rPr lang="de-DE" dirty="0"/>
+              <a:t> </a:t>
+            </a:r>
+          </a:p>
+          <a:p>
+            <a:r>
+              <a:rPr lang="de-DE" dirty="0"/>
+              <a:t>[9] ANNA Dashboard – erstellt von Lukas Güldenhaupt</a:t>
+            </a:r>
+          </a:p>
+          <a:p>
+            <a:r>
+              <a:rPr lang="de-DE" dirty="0"/>
+              <a:t>[10] ANNA Projektseite –erstellt von Lukas Güldenhaupt</a:t>
+            </a:r>
+          </a:p>
+          <a:p>
+            <a:r>
+              <a:rPr lang="de-DE" dirty="0"/>
+              <a:t>[11] MongoDB Logo - </a:t>
+            </a:r>
+            <a:r>
+              <a:rPr lang="de-DE" dirty="0">
+                <a:hlinkClick r:id="rId7"/>
+              </a:rPr>
+              <a:t>https://www.mongodb.com/</a:t>
+            </a:r>
+            <a:r>
+              <a:rPr lang="de-DE" dirty="0"/>
+              <a:t> </a:t>
+            </a:r>
+          </a:p>
+          <a:p>
+            <a:r>
+              <a:rPr lang="de-DE" dirty="0"/>
+              <a:t>[12] Collection Eintrag – erstellt von Lukas Güldenhaupt</a:t>
+            </a:r>
+            <a:br>
+              <a:rPr lang="de-DE" dirty="0"/>
+            </a:br>
+            <a:r>
+              <a:rPr lang="de-DE" dirty="0"/>
+              <a:t>[13] ANNA </a:t>
+            </a:r>
+            <a:r>
+              <a:rPr lang="de-DE" dirty="0" err="1"/>
+              <a:t>Configurationsdateiseite</a:t>
+            </a:r>
+            <a:r>
+              <a:rPr lang="de-DE" dirty="0"/>
+              <a:t> –erstellt von </a:t>
+            </a:r>
+            <a:r>
+              <a:rPr lang="de-DE"/>
+              <a:t>Lukas Güldenhaupt</a:t>
+            </a:r>
+            <a:endParaRPr lang="de-DE" dirty="0"/>
+          </a:p>
           <a:p>
             <a:endParaRPr lang="de-DE" dirty="0"/>
           </a:p>
@@ -3763,7 +4133,7 @@
             <a:pPr lvl="1"/>
             <a:r>
               <a:rPr lang="de-DE" dirty="0" err="1"/>
-              <a:t>Typescript</a:t>
+              <a:t>TypeScript</a:t>
             </a:r>
             <a:endParaRPr lang="de-DE" dirty="0"/>
           </a:p>
@@ -3873,35 +4243,72 @@
             <a:pPr lvl="2"/>
             <a:r>
               <a:rPr lang="de-DE" dirty="0"/>
+              <a:t>Arbeit mit Deep </a:t>
+            </a:r>
+            <a:r>
+              <a:rPr lang="de-DE" dirty="0" err="1"/>
+              <a:t>Nerual</a:t>
+            </a:r>
+            <a:r>
+              <a:rPr lang="de-DE" dirty="0"/>
+              <a:t> Networks:</a:t>
+            </a:r>
+          </a:p>
+          <a:p>
+            <a:pPr lvl="3"/>
+            <a:r>
+              <a:rPr lang="de-DE" dirty="0"/>
               <a:t>Verfügbare Tools divers</a:t>
             </a:r>
           </a:p>
           <a:p>
-            <a:pPr lvl="2"/>
+            <a:pPr lvl="3"/>
             <a:r>
               <a:rPr lang="de-DE" dirty="0"/>
               <a:t>Großer und unterschiedlicher Parameterraum</a:t>
             </a:r>
           </a:p>
           <a:p>
-            <a:pPr lvl="2"/>
+            <a:pPr lvl="3"/>
             <a:r>
               <a:rPr lang="de-DE" dirty="0"/>
               <a:t>Hunderte trainierte Netzwerke</a:t>
             </a:r>
           </a:p>
           <a:p>
-            <a:pPr lvl="2"/>
+            <a:pPr lvl="3"/>
             <a:r>
               <a:rPr lang="de-DE" dirty="0"/>
               <a:t>Viele Ausgabedateien</a:t>
             </a:r>
           </a:p>
           <a:p>
-            <a:pPr lvl="2"/>
-            <a:r>
-              <a:rPr lang="de-DE" dirty="0"/>
-              <a:t>Keine Übersicht</a:t>
+            <a:pPr lvl="3"/>
+            <a:r>
+              <a:rPr lang="de-DE" dirty="0"/>
+              <a:t>Aufwand um Ergebnisse zu teilen</a:t>
+            </a:r>
+          </a:p>
+          <a:p>
+            <a:pPr lvl="3"/>
+            <a:endParaRPr lang="de-DE" dirty="0"/>
+          </a:p>
+          <a:p>
+            <a:pPr marL="363537" lvl="3" indent="0">
+              <a:buNone/>
+            </a:pPr>
+            <a:r>
+              <a:rPr lang="de-DE" dirty="0"/>
+              <a:t>	</a:t>
+            </a:r>
+          </a:p>
+          <a:p>
+            <a:pPr marL="363537" lvl="3" indent="0">
+              <a:buNone/>
+            </a:pPr>
+            <a:r>
+              <a:rPr lang="de-DE" dirty="0"/>
+              <a:t>	Übersicht zu behalten kann anstrengend sein</a:t>
             </a:r>
           </a:p>
           <a:p>
@@ -3911,6 +4318,125 @@
           <a:p>
             <a:pPr lvl="2"/>
             <a:endParaRPr lang="de-DE" dirty="0"/>
+          </a:p>
+        </p:txBody>
+      </p:sp>
+      <p:sp>
+        <p:nvSpPr>
+          <p:cNvPr id="2" name="Pfeil: nach rechts 1">
+            <a:extLst>
+              <a:ext uri="{FF2B5EF4-FFF2-40B4-BE49-F238E27FC236}">
+                <a16:creationId xmlns:a16="http://schemas.microsoft.com/office/drawing/2014/main" id="{ACA71D07-2F85-49FC-B86E-E8CF5A24150D}"/>
+              </a:ext>
+            </a:extLst>
+          </p:cNvPr>
+          <p:cNvSpPr/>
+          <p:nvPr/>
+        </p:nvSpPr>
+        <p:spPr>
+          <a:xfrm>
+            <a:off x="797945" y="3355597"/>
+            <a:ext cx="411060" cy="285226"/>
+          </a:xfrm>
+          <a:prstGeom prst="rightArrow">
+            <a:avLst/>
+          </a:prstGeom>
+          <a:solidFill>
+            <a:schemeClr val="accent1"/>
+          </a:solidFill>
+          <a:ln w="19050">
+            <a:solidFill>
+              <a:schemeClr val="tx1"/>
+            </a:solidFill>
+          </a:ln>
+        </p:spPr>
+        <p:style>
+          <a:lnRef idx="2">
+            <a:schemeClr val="accent5">
+              <a:shade val="50000"/>
+            </a:schemeClr>
+          </a:lnRef>
+          <a:fillRef idx="1">
+            <a:schemeClr val="accent5"/>
+          </a:fillRef>
+          <a:effectRef idx="0">
+            <a:schemeClr val="accent5"/>
+          </a:effectRef>
+          <a:fontRef idx="minor">
+            <a:schemeClr val="lt1"/>
+          </a:fontRef>
+        </p:style>
+        <p:txBody>
+          <a:bodyPr rtlCol="0" anchor="ctr"/>
+          <a:lstStyle/>
+          <a:p>
+            <a:pPr algn="ctr"/>
+            <a:endParaRPr lang="de-DE" dirty="0"/>
+          </a:p>
+        </p:txBody>
+      </p:sp>
+      <p:pic>
+        <p:nvPicPr>
+          <p:cNvPr id="7" name="Grafik 6">
+            <a:extLst>
+              <a:ext uri="{FF2B5EF4-FFF2-40B4-BE49-F238E27FC236}">
+                <a16:creationId xmlns:a16="http://schemas.microsoft.com/office/drawing/2014/main" id="{CA976E8C-8FC6-48F4-8865-D20BD161DD7A}"/>
+              </a:ext>
+            </a:extLst>
+          </p:cNvPr>
+          <p:cNvPicPr>
+            <a:picLocks noChangeAspect="1"/>
+          </p:cNvPicPr>
+          <p:nvPr/>
+        </p:nvPicPr>
+        <p:blipFill>
+          <a:blip r:embed="rId2"/>
+          <a:stretch>
+            <a:fillRect/>
+          </a:stretch>
+        </p:blipFill>
+        <p:spPr>
+          <a:xfrm>
+            <a:off x="5646204" y="904438"/>
+            <a:ext cx="3161246" cy="5049123"/>
+          </a:xfrm>
+          <a:prstGeom prst="rect">
+            <a:avLst/>
+          </a:prstGeom>
+        </p:spPr>
+      </p:pic>
+      <p:sp>
+        <p:nvSpPr>
+          <p:cNvPr id="11" name="Textfeld 10">
+            <a:extLst>
+              <a:ext uri="{FF2B5EF4-FFF2-40B4-BE49-F238E27FC236}">
+                <a16:creationId xmlns:a16="http://schemas.microsoft.com/office/drawing/2014/main" id="{A6C75E35-5378-4223-93A9-1C8E56B0C958}"/>
+              </a:ext>
+            </a:extLst>
+          </p:cNvPr>
+          <p:cNvSpPr txBox="1"/>
+          <p:nvPr/>
+        </p:nvSpPr>
+        <p:spPr>
+          <a:xfrm>
+            <a:off x="8874374" y="5929913"/>
+            <a:ext cx="269626" cy="184666"/>
+          </a:xfrm>
+          <a:prstGeom prst="rect">
+            <a:avLst/>
+          </a:prstGeom>
+          <a:noFill/>
+        </p:spPr>
+        <p:txBody>
+          <a:bodyPr wrap="none" rtlCol="0">
+            <a:spAutoFit/>
+          </a:bodyPr>
+          <a:lstStyle/>
+          <a:p>
+            <a:r>
+              <a:rPr lang="de-DE" sz="600" dirty="0"/>
+              <a:t>[1]</a:t>
+            </a:r>
           </a:p>
         </p:txBody>
       </p:sp>
@@ -3977,78 +4503,66 @@
           <a:lstStyle/>
           <a:p>
             <a:r>
-              <a:rPr lang="de-DE" dirty="0" err="1"/>
+              <a:rPr lang="de-DE" b="1" dirty="0" err="1"/>
               <a:t>Webfrontend</a:t>
             </a:r>
             <a:r>
-              <a:rPr lang="de-DE" dirty="0"/>
-              <a:t> ANNA (Administrative </a:t>
-            </a:r>
-            <a:r>
-              <a:rPr lang="de-DE" dirty="0" err="1"/>
+              <a:rPr lang="de-DE" b="1" dirty="0"/>
+              <a:t> „Administrative </a:t>
+            </a:r>
+            <a:r>
+              <a:rPr lang="de-DE" b="1" dirty="0" err="1"/>
               <a:t>Neural</a:t>
             </a:r>
             <a:r>
-              <a:rPr lang="de-DE" dirty="0"/>
+              <a:rPr lang="de-DE" b="1" dirty="0"/>
               <a:t> Network </a:t>
             </a:r>
             <a:r>
-              <a:rPr lang="de-DE" dirty="0" err="1"/>
+              <a:rPr lang="de-DE" b="1" dirty="0" err="1"/>
               <a:t>Application</a:t>
             </a:r>
             <a:r>
-              <a:rPr lang="de-DE" dirty="0"/>
-              <a:t>)</a:t>
-            </a:r>
-          </a:p>
-          <a:p>
-            <a:pPr marL="285750" indent="-285750">
-              <a:buFont typeface="Wingdings" panose="05000000000000000000" pitchFamily="2" charset="2"/>
-              <a:buChar char="§"/>
-            </a:pPr>
+              <a:rPr lang="de-DE" b="1" dirty="0"/>
+              <a:t>“ (ANNA)</a:t>
+            </a:r>
+          </a:p>
+          <a:p>
+            <a:endParaRPr lang="de-DE" b="1" dirty="0"/>
+          </a:p>
+          <a:p>
+            <a:pPr marL="647700" lvl="2" indent="-285750"/>
             <a:r>
               <a:rPr lang="de-DE" dirty="0"/>
               <a:t>Verwaltung von Projekten</a:t>
             </a:r>
           </a:p>
           <a:p>
-            <a:pPr marL="285750" indent="-285750">
-              <a:buFont typeface="Wingdings" panose="05000000000000000000" pitchFamily="2" charset="2"/>
-              <a:buChar char="§"/>
-            </a:pPr>
+            <a:pPr marL="647700" lvl="2" indent="-285750"/>
             <a:r>
               <a:rPr lang="de-DE" dirty="0"/>
               <a:t>Speichern von Konfigurationsdateien und Ergebnissen</a:t>
             </a:r>
           </a:p>
           <a:p>
-            <a:pPr marL="285750" indent="-285750">
-              <a:buFont typeface="Wingdings" panose="05000000000000000000" pitchFamily="2" charset="2"/>
-              <a:buChar char="§"/>
-            </a:pPr>
+            <a:pPr marL="647700" lvl="2" indent="-285750"/>
             <a:r>
               <a:rPr lang="de-DE" dirty="0"/>
               <a:t>Ausgaben vereinheitlichen</a:t>
             </a:r>
           </a:p>
           <a:p>
-            <a:pPr marL="285750" indent="-285750">
-              <a:buFont typeface="Wingdings" panose="05000000000000000000" pitchFamily="2" charset="2"/>
-              <a:buChar char="§"/>
-            </a:pPr>
+            <a:pPr marL="647700" lvl="2" indent="-285750"/>
             <a:r>
               <a:rPr lang="de-DE" dirty="0"/>
               <a:t>Filterfunktion</a:t>
             </a:r>
           </a:p>
           <a:p>
-            <a:pPr marL="285750" indent="-285750">
-              <a:buFont typeface="Wingdings" panose="05000000000000000000" pitchFamily="2" charset="2"/>
-              <a:buChar char="§"/>
-            </a:pPr>
-            <a:r>
-              <a:rPr lang="de-DE" dirty="0"/>
-              <a:t>Mehr Übersicht</a:t>
+            <a:pPr marL="647700" lvl="2" indent="-285750"/>
+            <a:r>
+              <a:rPr lang="de-DE" dirty="0"/>
+              <a:t>Bessere Übersicht</a:t>
             </a:r>
           </a:p>
           <a:p>
@@ -4063,6 +4577,77 @@
           </a:p>
           <a:p>
             <a:endParaRPr lang="de-DE" dirty="0"/>
+          </a:p>
+        </p:txBody>
+      </p:sp>
+      <p:pic>
+        <p:nvPicPr>
+          <p:cNvPr id="4" name="Grafik 3">
+            <a:extLst>
+              <a:ext uri="{FF2B5EF4-FFF2-40B4-BE49-F238E27FC236}">
+                <a16:creationId xmlns:a16="http://schemas.microsoft.com/office/drawing/2014/main" id="{DC6FD70B-1739-4772-A7A4-C17ADC205173}"/>
+              </a:ext>
+            </a:extLst>
+          </p:cNvPr>
+          <p:cNvPicPr>
+            <a:picLocks noChangeAspect="1"/>
+          </p:cNvPicPr>
+          <p:nvPr/>
+        </p:nvPicPr>
+        <p:blipFill>
+          <a:blip r:embed="rId2" cstate="print">
+            <a:extLst>
+              <a:ext uri="{28A0092B-C50C-407E-A947-70E740481C1C}">
+                <a14:useLocalDpi xmlns:a14="http://schemas.microsoft.com/office/drawing/2010/main" val="0"/>
+              </a:ext>
+            </a:extLst>
+          </a:blip>
+          <a:stretch>
+            <a:fillRect/>
+          </a:stretch>
+        </p:blipFill>
+        <p:spPr>
+          <a:xfrm>
+            <a:off x="5167620" y="3833769"/>
+            <a:ext cx="3703272" cy="2083090"/>
+          </a:xfrm>
+          <a:prstGeom prst="rect">
+            <a:avLst/>
+          </a:prstGeom>
+        </p:spPr>
+      </p:pic>
+      <p:sp>
+        <p:nvSpPr>
+          <p:cNvPr id="7" name="Textfeld 6">
+            <a:extLst>
+              <a:ext uri="{FF2B5EF4-FFF2-40B4-BE49-F238E27FC236}">
+                <a16:creationId xmlns:a16="http://schemas.microsoft.com/office/drawing/2014/main" id="{837D562A-5DE7-4F95-8498-0968DA4F00E7}"/>
+              </a:ext>
+            </a:extLst>
+          </p:cNvPr>
+          <p:cNvSpPr txBox="1"/>
+          <p:nvPr/>
+        </p:nvSpPr>
+        <p:spPr>
+          <a:xfrm>
+            <a:off x="8672637" y="5742668"/>
+            <a:ext cx="269626" cy="184666"/>
+          </a:xfrm>
+          <a:prstGeom prst="rect">
+            <a:avLst/>
+          </a:prstGeom>
+          <a:noFill/>
+        </p:spPr>
+        <p:txBody>
+          <a:bodyPr wrap="none" rtlCol="0">
+            <a:spAutoFit/>
+          </a:bodyPr>
+          <a:lstStyle/>
+          <a:p>
+            <a:r>
+              <a:rPr lang="de-DE" sz="600" dirty="0"/>
+              <a:t>[2]</a:t>
+            </a:r>
           </a:p>
         </p:txBody>
       </p:sp>
@@ -4187,7 +4772,7 @@
             <a:pPr lvl="1"/>
             <a:r>
               <a:rPr lang="de-DE" dirty="0" err="1"/>
-              <a:t>Typescript</a:t>
+              <a:t>TypeScript</a:t>
             </a:r>
             <a:endParaRPr lang="de-DE" dirty="0"/>
           </a:p>
@@ -4276,7 +4861,7 @@
           <a:p>
             <a:r>
               <a:rPr lang="de-DE" dirty="0" err="1"/>
-              <a:t>Typescript</a:t>
+              <a:t>TypeScript</a:t>
             </a:r>
             <a:endParaRPr lang="de-DE" dirty="0"/>
           </a:p>
@@ -4297,22 +4882,17 @@
           <a:bodyPr/>
           <a:lstStyle/>
           <a:p>
-            <a:pPr lvl="1"/>
-            <a:r>
-              <a:rPr lang="de-DE" dirty="0"/>
-              <a:t>Nutzung von </a:t>
-            </a:r>
+            <a:pPr lvl="3"/>
+            <a:r>
+              <a:rPr lang="de-DE" dirty="0"/>
+              <a:t>Nutzung von JavaScript</a:t>
+            </a:r>
+          </a:p>
+          <a:p>
+            <a:pPr lvl="3"/>
             <a:r>
               <a:rPr lang="de-DE" dirty="0" err="1"/>
-              <a:t>Javascript</a:t>
-            </a:r>
-            <a:endParaRPr lang="de-DE" dirty="0"/>
-          </a:p>
-          <a:p>
-            <a:pPr lvl="1"/>
-            <a:r>
-              <a:rPr lang="de-DE" dirty="0" err="1"/>
-              <a:t>Typescript</a:t>
+              <a:t>TypeScript</a:t>
             </a:r>
             <a:r>
               <a:rPr lang="de-DE" dirty="0"/>
@@ -4320,17 +4900,388 @@
             </a:r>
           </a:p>
           <a:p>
-            <a:pPr lvl="1"/>
-            <a:r>
-              <a:rPr lang="de-DE" dirty="0"/>
-              <a:t>Java-Ähnlich</a:t>
-            </a:r>
-          </a:p>
-          <a:p>
-            <a:pPr lvl="1"/>
-            <a:r>
-              <a:rPr lang="de-DE" dirty="0"/>
-              <a:t>Einfacher Einstieg</a:t>
+            <a:pPr lvl="4"/>
+            <a:r>
+              <a:rPr lang="de-DE" dirty="0"/>
+              <a:t>Klassen, Vererbung, Interfaces, anonyme Funktionen, etc.</a:t>
+            </a:r>
+          </a:p>
+          <a:p>
+            <a:pPr lvl="3"/>
+            <a:r>
+              <a:rPr lang="de-DE" dirty="0"/>
+              <a:t>Java-ähnlich</a:t>
+            </a:r>
+          </a:p>
+        </p:txBody>
+      </p:sp>
+      <p:pic>
+        <p:nvPicPr>
+          <p:cNvPr id="2050" name="Picture 2" descr="Logo von TypeScript">
+            <a:extLst>
+              <a:ext uri="{FF2B5EF4-FFF2-40B4-BE49-F238E27FC236}">
+                <a16:creationId xmlns:a16="http://schemas.microsoft.com/office/drawing/2014/main" id="{3789AFF9-D8B7-4D33-A791-9532E62FDBD4}"/>
+              </a:ext>
+            </a:extLst>
+          </p:cNvPr>
+          <p:cNvPicPr>
+            <a:picLocks noChangeAspect="1" noChangeArrowheads="1"/>
+          </p:cNvPicPr>
+          <p:nvPr/>
+        </p:nvPicPr>
+        <p:blipFill>
+          <a:blip r:embed="rId3">
+            <a:extLst>
+              <a:ext uri="{28A0092B-C50C-407E-A947-70E740481C1C}">
+                <a14:useLocalDpi xmlns:a14="http://schemas.microsoft.com/office/drawing/2010/main" val="0"/>
+              </a:ext>
+            </a:extLst>
+          </a:blip>
+          <a:srcRect/>
+          <a:stretch>
+            <a:fillRect/>
+          </a:stretch>
+        </p:blipFill>
+        <p:spPr bwMode="auto">
+          <a:xfrm>
+            <a:off x="4101610" y="2961314"/>
+            <a:ext cx="2006291" cy="489535"/>
+          </a:xfrm>
+          <a:prstGeom prst="rect">
+            <a:avLst/>
+          </a:prstGeom>
+          <a:noFill/>
+          <a:extLst>
+            <a:ext uri="{909E8E84-426E-40DD-AFC4-6F175D3DCCD1}">
+              <a14:hiddenFill xmlns:a14="http://schemas.microsoft.com/office/drawing/2010/main">
+                <a:solidFill>
+                  <a:srgbClr val="FFFFFF"/>
+                </a:solidFill>
+              </a14:hiddenFill>
+            </a:ext>
+          </a:extLst>
+        </p:spPr>
+      </p:pic>
+      <p:pic>
+        <p:nvPicPr>
+          <p:cNvPr id="2052" name="Picture 4" descr="Unofficial logo from JSConf EU 2011">
+            <a:extLst>
+              <a:ext uri="{FF2B5EF4-FFF2-40B4-BE49-F238E27FC236}">
+                <a16:creationId xmlns:a16="http://schemas.microsoft.com/office/drawing/2014/main" id="{8A6A1536-FD9C-4897-8E42-DC7AE4CE65B4}"/>
+              </a:ext>
+            </a:extLst>
+          </p:cNvPr>
+          <p:cNvPicPr>
+            <a:picLocks noChangeAspect="1" noChangeArrowheads="1"/>
+          </p:cNvPicPr>
+          <p:nvPr/>
+        </p:nvPicPr>
+        <p:blipFill>
+          <a:blip r:embed="rId4">
+            <a:extLst>
+              <a:ext uri="{28A0092B-C50C-407E-A947-70E740481C1C}">
+                <a14:useLocalDpi xmlns:a14="http://schemas.microsoft.com/office/drawing/2010/main" val="0"/>
+              </a:ext>
+            </a:extLst>
+          </a:blip>
+          <a:srcRect/>
+          <a:stretch>
+            <a:fillRect/>
+          </a:stretch>
+        </p:blipFill>
+        <p:spPr bwMode="auto">
+          <a:xfrm>
+            <a:off x="1625314" y="2702109"/>
+            <a:ext cx="869048" cy="869048"/>
+          </a:xfrm>
+          <a:prstGeom prst="rect">
+            <a:avLst/>
+          </a:prstGeom>
+          <a:noFill/>
+          <a:extLst>
+            <a:ext uri="{909E8E84-426E-40DD-AFC4-6F175D3DCCD1}">
+              <a14:hiddenFill xmlns:a14="http://schemas.microsoft.com/office/drawing/2010/main">
+                <a:solidFill>
+                  <a:srgbClr val="FFFFFF"/>
+                </a:solidFill>
+              </a14:hiddenFill>
+            </a:ext>
+          </a:extLst>
+        </p:spPr>
+      </p:pic>
+      <p:pic>
+        <p:nvPicPr>
+          <p:cNvPr id="3" name="Grafik 2">
+            <a:extLst>
+              <a:ext uri="{FF2B5EF4-FFF2-40B4-BE49-F238E27FC236}">
+                <a16:creationId xmlns:a16="http://schemas.microsoft.com/office/drawing/2014/main" id="{1C377062-7C4E-4B2F-946E-B6AF222E08D5}"/>
+              </a:ext>
+            </a:extLst>
+          </p:cNvPr>
+          <p:cNvPicPr>
+            <a:picLocks noChangeAspect="1"/>
+          </p:cNvPicPr>
+          <p:nvPr/>
+        </p:nvPicPr>
+        <p:blipFill>
+          <a:blip r:embed="rId5"/>
+          <a:stretch>
+            <a:fillRect/>
+          </a:stretch>
+        </p:blipFill>
+        <p:spPr>
+          <a:xfrm>
+            <a:off x="6442852" y="3649211"/>
+            <a:ext cx="2701148" cy="2042937"/>
+          </a:xfrm>
+          <a:prstGeom prst="rect">
+            <a:avLst/>
+          </a:prstGeom>
+        </p:spPr>
+      </p:pic>
+      <p:pic>
+        <p:nvPicPr>
+          <p:cNvPr id="4" name="Grafik 3">
+            <a:extLst>
+              <a:ext uri="{FF2B5EF4-FFF2-40B4-BE49-F238E27FC236}">
+                <a16:creationId xmlns:a16="http://schemas.microsoft.com/office/drawing/2014/main" id="{9B66C71C-66DB-4B24-8A20-1E2EB587BF77}"/>
+              </a:ext>
+            </a:extLst>
+          </p:cNvPr>
+          <p:cNvPicPr>
+            <a:picLocks noChangeAspect="1"/>
+          </p:cNvPicPr>
+          <p:nvPr/>
+        </p:nvPicPr>
+        <p:blipFill>
+          <a:blip r:embed="rId6"/>
+          <a:stretch>
+            <a:fillRect/>
+          </a:stretch>
+        </p:blipFill>
+        <p:spPr>
+          <a:xfrm>
+            <a:off x="528223" y="3683076"/>
+            <a:ext cx="3219426" cy="1688510"/>
+          </a:xfrm>
+          <a:prstGeom prst="rect">
+            <a:avLst/>
+          </a:prstGeom>
+        </p:spPr>
+      </p:pic>
+      <p:pic>
+        <p:nvPicPr>
+          <p:cNvPr id="5" name="Grafik 4">
+            <a:extLst>
+              <a:ext uri="{FF2B5EF4-FFF2-40B4-BE49-F238E27FC236}">
+                <a16:creationId xmlns:a16="http://schemas.microsoft.com/office/drawing/2014/main" id="{2E96666E-077E-41FA-A0AF-EF76C65EE349}"/>
+              </a:ext>
+            </a:extLst>
+          </p:cNvPr>
+          <p:cNvPicPr>
+            <a:picLocks noChangeAspect="1"/>
+          </p:cNvPicPr>
+          <p:nvPr/>
+        </p:nvPicPr>
+        <p:blipFill>
+          <a:blip r:embed="rId7"/>
+          <a:stretch>
+            <a:fillRect/>
+          </a:stretch>
+        </p:blipFill>
+        <p:spPr>
+          <a:xfrm>
+            <a:off x="3766660" y="3674687"/>
+            <a:ext cx="2676192" cy="2051326"/>
+          </a:xfrm>
+          <a:prstGeom prst="rect">
+            <a:avLst/>
+          </a:prstGeom>
+        </p:spPr>
+      </p:pic>
+      <p:pic>
+        <p:nvPicPr>
+          <p:cNvPr id="2054" name="Picture 6" descr="Bildergebnis für java">
+            <a:extLst>
+              <a:ext uri="{FF2B5EF4-FFF2-40B4-BE49-F238E27FC236}">
+                <a16:creationId xmlns:a16="http://schemas.microsoft.com/office/drawing/2014/main" id="{E8133BDE-4202-4E75-ABF6-1254E3A379B6}"/>
+              </a:ext>
+            </a:extLst>
+          </p:cNvPr>
+          <p:cNvPicPr>
+            <a:picLocks noChangeAspect="1" noChangeArrowheads="1"/>
+          </p:cNvPicPr>
+          <p:nvPr/>
+        </p:nvPicPr>
+        <p:blipFill>
+          <a:blip r:embed="rId8" cstate="print">
+            <a:extLst>
+              <a:ext uri="{28A0092B-C50C-407E-A947-70E740481C1C}">
+                <a14:useLocalDpi xmlns:a14="http://schemas.microsoft.com/office/drawing/2010/main" val="0"/>
+              </a:ext>
+            </a:extLst>
+          </a:blip>
+          <a:srcRect/>
+          <a:stretch>
+            <a:fillRect/>
+          </a:stretch>
+        </p:blipFill>
+        <p:spPr bwMode="auto">
+          <a:xfrm>
+            <a:off x="6790553" y="2507999"/>
+            <a:ext cx="1802207" cy="1107347"/>
+          </a:xfrm>
+          <a:prstGeom prst="rect">
+            <a:avLst/>
+          </a:prstGeom>
+          <a:noFill/>
+          <a:extLst>
+            <a:ext uri="{909E8E84-426E-40DD-AFC4-6F175D3DCCD1}">
+              <a14:hiddenFill xmlns:a14="http://schemas.microsoft.com/office/drawing/2010/main">
+                <a:solidFill>
+                  <a:srgbClr val="FFFFFF"/>
+                </a:solidFill>
+              </a14:hiddenFill>
+            </a:ext>
+          </a:extLst>
+        </p:spPr>
+      </p:pic>
+      <p:sp>
+        <p:nvSpPr>
+          <p:cNvPr id="6" name="Textfeld 5">
+            <a:extLst>
+              <a:ext uri="{FF2B5EF4-FFF2-40B4-BE49-F238E27FC236}">
+                <a16:creationId xmlns:a16="http://schemas.microsoft.com/office/drawing/2014/main" id="{14D81DEA-A1EC-4043-B487-C2C8291AA196}"/>
+              </a:ext>
+            </a:extLst>
+          </p:cNvPr>
+          <p:cNvSpPr txBox="1"/>
+          <p:nvPr/>
+        </p:nvSpPr>
+        <p:spPr>
+          <a:xfrm>
+            <a:off x="2431523" y="3478824"/>
+            <a:ext cx="269626" cy="184666"/>
+          </a:xfrm>
+          <a:prstGeom prst="rect">
+            <a:avLst/>
+          </a:prstGeom>
+          <a:noFill/>
+        </p:spPr>
+        <p:txBody>
+          <a:bodyPr wrap="none" rtlCol="0">
+            <a:spAutoFit/>
+          </a:bodyPr>
+          <a:lstStyle/>
+          <a:p>
+            <a:r>
+              <a:rPr lang="de-DE" sz="600" dirty="0"/>
+              <a:t>[3]</a:t>
+            </a:r>
+          </a:p>
+        </p:txBody>
+      </p:sp>
+      <p:sp>
+        <p:nvSpPr>
+          <p:cNvPr id="12" name="Textfeld 11">
+            <a:extLst>
+              <a:ext uri="{FF2B5EF4-FFF2-40B4-BE49-F238E27FC236}">
+                <a16:creationId xmlns:a16="http://schemas.microsoft.com/office/drawing/2014/main" id="{14AC537F-AE97-45F7-A6A8-8692B7F1A99C}"/>
+              </a:ext>
+            </a:extLst>
+          </p:cNvPr>
+          <p:cNvSpPr txBox="1"/>
+          <p:nvPr/>
+        </p:nvSpPr>
+        <p:spPr>
+          <a:xfrm>
+            <a:off x="6018097" y="3439687"/>
+            <a:ext cx="269626" cy="184666"/>
+          </a:xfrm>
+          <a:prstGeom prst="rect">
+            <a:avLst/>
+          </a:prstGeom>
+          <a:noFill/>
+        </p:spPr>
+        <p:txBody>
+          <a:bodyPr wrap="none" rtlCol="0">
+            <a:spAutoFit/>
+          </a:bodyPr>
+          <a:lstStyle/>
+          <a:p>
+            <a:r>
+              <a:rPr lang="de-DE" sz="600" dirty="0"/>
+              <a:t>[4]</a:t>
+            </a:r>
+          </a:p>
+        </p:txBody>
+      </p:sp>
+      <p:sp>
+        <p:nvSpPr>
+          <p:cNvPr id="16" name="Textfeld 15">
+            <a:extLst>
+              <a:ext uri="{FF2B5EF4-FFF2-40B4-BE49-F238E27FC236}">
+                <a16:creationId xmlns:a16="http://schemas.microsoft.com/office/drawing/2014/main" id="{65064E3C-B332-47FB-BB96-69361F6C2F90}"/>
+              </a:ext>
+            </a:extLst>
+          </p:cNvPr>
+          <p:cNvSpPr txBox="1"/>
+          <p:nvPr/>
+        </p:nvSpPr>
+        <p:spPr>
+          <a:xfrm>
+            <a:off x="8537824" y="5731533"/>
+            <a:ext cx="269626" cy="184666"/>
+          </a:xfrm>
+          <a:prstGeom prst="rect">
+            <a:avLst/>
+          </a:prstGeom>
+          <a:noFill/>
+        </p:spPr>
+        <p:txBody>
+          <a:bodyPr wrap="none" rtlCol="0">
+            <a:spAutoFit/>
+          </a:bodyPr>
+          <a:lstStyle/>
+          <a:p>
+            <a:r>
+              <a:rPr lang="de-DE" sz="600" dirty="0"/>
+              <a:t>[6]</a:t>
+            </a:r>
+          </a:p>
+        </p:txBody>
+      </p:sp>
+      <p:sp>
+        <p:nvSpPr>
+          <p:cNvPr id="17" name="Textfeld 16">
+            <a:extLst>
+              <a:ext uri="{FF2B5EF4-FFF2-40B4-BE49-F238E27FC236}">
+                <a16:creationId xmlns:a16="http://schemas.microsoft.com/office/drawing/2014/main" id="{3779B4DA-8254-422C-B14B-F76A1DADB778}"/>
+              </a:ext>
+            </a:extLst>
+          </p:cNvPr>
+          <p:cNvSpPr txBox="1"/>
+          <p:nvPr/>
+        </p:nvSpPr>
+        <p:spPr>
+          <a:xfrm>
+            <a:off x="8430479" y="3425064"/>
+            <a:ext cx="269626" cy="184666"/>
+          </a:xfrm>
+          <a:prstGeom prst="rect">
+            <a:avLst/>
+          </a:prstGeom>
+          <a:noFill/>
+        </p:spPr>
+        <p:txBody>
+          <a:bodyPr wrap="none" rtlCol="0">
+            <a:spAutoFit/>
+          </a:bodyPr>
+          <a:lstStyle/>
+          <a:p>
+            <a:r>
+              <a:rPr lang="de-DE" sz="600" dirty="0"/>
+              <a:t>[5]</a:t>
             </a:r>
           </a:p>
         </p:txBody>
@@ -4397,7 +5348,7 @@
           <a:bodyPr/>
           <a:lstStyle/>
           <a:p>
-            <a:pPr lvl="1"/>
+            <a:pPr lvl="3"/>
             <a:r>
               <a:rPr lang="de-DE" dirty="0"/>
               <a:t>Meteor auf Basis von </a:t>
@@ -4409,44 +5360,39 @@
             <a:endParaRPr lang="de-DE" dirty="0"/>
           </a:p>
           <a:p>
-            <a:pPr lvl="1"/>
+            <a:pPr lvl="3"/>
             <a:r>
               <a:rPr lang="de-DE" dirty="0"/>
               <a:t>Einfache Adaption und schneller Start</a:t>
             </a:r>
           </a:p>
           <a:p>
-            <a:pPr lvl="1"/>
+            <a:pPr lvl="3"/>
             <a:r>
               <a:rPr lang="de-DE" dirty="0"/>
               <a:t>Plattformunabhängig</a:t>
             </a:r>
           </a:p>
           <a:p>
-            <a:pPr lvl="1"/>
+            <a:pPr lvl="3"/>
             <a:r>
               <a:rPr lang="de-DE" dirty="0" err="1"/>
-              <a:t>Typescript</a:t>
-            </a:r>
-            <a:r>
-              <a:rPr lang="de-DE" dirty="0"/>
-              <a:t> bzw. </a:t>
-            </a:r>
-            <a:r>
-              <a:rPr lang="de-DE" dirty="0" err="1"/>
-              <a:t>Javascript</a:t>
-            </a:r>
-            <a:endParaRPr lang="de-DE" dirty="0"/>
-          </a:p>
-          <a:p>
-            <a:pPr lvl="1"/>
-            <a:r>
-              <a:rPr lang="de-DE" dirty="0"/>
-              <a:t>Reaktiv mithilfe von DDP</a:t>
-            </a:r>
-          </a:p>
-          <a:p>
-            <a:pPr lvl="1"/>
+              <a:t>TypeScript</a:t>
+            </a:r>
+            <a:r>
+              <a:rPr lang="de-DE" dirty="0"/>
+              <a:t> bzw. JavaScript</a:t>
+            </a:r>
+          </a:p>
+          <a:p>
+            <a:pPr lvl="3"/>
+            <a:r>
+              <a:rPr lang="de-DE" dirty="0"/>
+              <a:t>Reaktiv mithilfe von Meteors Distributed Data Protocol</a:t>
+            </a:r>
+          </a:p>
+          <a:p>
+            <a:pPr lvl="3"/>
             <a:r>
               <a:rPr lang="de-DE" dirty="0"/>
               <a:t>Erweiterung mit Packages</a:t>
@@ -4458,6 +5404,246 @@
           </a:p>
         </p:txBody>
       </p:sp>
+      <p:pic>
+        <p:nvPicPr>
+          <p:cNvPr id="3076" name="Picture 4" descr="Bildergebnis für meteor logo">
+            <a:extLst>
+              <a:ext uri="{FF2B5EF4-FFF2-40B4-BE49-F238E27FC236}">
+                <a16:creationId xmlns:a16="http://schemas.microsoft.com/office/drawing/2014/main" id="{00BFED45-CCBD-40B4-BE65-A7BC905AC84E}"/>
+              </a:ext>
+            </a:extLst>
+          </p:cNvPr>
+          <p:cNvPicPr>
+            <a:picLocks noChangeAspect="1" noChangeArrowheads="1"/>
+          </p:cNvPicPr>
+          <p:nvPr/>
+        </p:nvPicPr>
+        <p:blipFill rotWithShape="1">
+          <a:blip r:embed="rId2">
+            <a:extLst>
+              <a:ext uri="{28A0092B-C50C-407E-A947-70E740481C1C}">
+                <a14:useLocalDpi xmlns:a14="http://schemas.microsoft.com/office/drawing/2010/main" val="0"/>
+              </a:ext>
+            </a:extLst>
+          </a:blip>
+          <a:srcRect t="31125" b="34710"/>
+          <a:stretch/>
+        </p:blipFill>
+        <p:spPr bwMode="auto">
+          <a:xfrm>
+            <a:off x="7077314" y="2605349"/>
+            <a:ext cx="1988890" cy="679508"/>
+          </a:xfrm>
+          <a:prstGeom prst="rect">
+            <a:avLst/>
+          </a:prstGeom>
+          <a:noFill/>
+          <a:extLst>
+            <a:ext uri="{909E8E84-426E-40DD-AFC4-6F175D3DCCD1}">
+              <a14:hiddenFill xmlns:a14="http://schemas.microsoft.com/office/drawing/2010/main">
+                <a:solidFill>
+                  <a:srgbClr val="FFFFFF"/>
+                </a:solidFill>
+              </a14:hiddenFill>
+            </a:ext>
+          </a:extLst>
+        </p:spPr>
+      </p:pic>
+      <p:pic>
+        <p:nvPicPr>
+          <p:cNvPr id="4" name="Grafik 3">
+            <a:extLst>
+              <a:ext uri="{FF2B5EF4-FFF2-40B4-BE49-F238E27FC236}">
+                <a16:creationId xmlns:a16="http://schemas.microsoft.com/office/drawing/2014/main" id="{9E0705C1-3D54-4D00-810D-BE1B058C6007}"/>
+              </a:ext>
+            </a:extLst>
+          </p:cNvPr>
+          <p:cNvPicPr>
+            <a:picLocks noChangeAspect="1"/>
+          </p:cNvPicPr>
+          <p:nvPr/>
+        </p:nvPicPr>
+        <p:blipFill>
+          <a:blip r:embed="rId3"/>
+          <a:stretch>
+            <a:fillRect/>
+          </a:stretch>
+        </p:blipFill>
+        <p:spPr>
+          <a:xfrm>
+            <a:off x="7164621" y="1031496"/>
+            <a:ext cx="1814277" cy="959368"/>
+          </a:xfrm>
+          <a:prstGeom prst="rect">
+            <a:avLst/>
+          </a:prstGeom>
+        </p:spPr>
+      </p:pic>
+      <p:sp>
+        <p:nvSpPr>
+          <p:cNvPr id="10" name="Textfeld 9">
+            <a:extLst>
+              <a:ext uri="{FF2B5EF4-FFF2-40B4-BE49-F238E27FC236}">
+                <a16:creationId xmlns:a16="http://schemas.microsoft.com/office/drawing/2014/main" id="{3A25918D-A3AB-45D8-82B2-E491B494F002}"/>
+              </a:ext>
+            </a:extLst>
+          </p:cNvPr>
+          <p:cNvSpPr txBox="1"/>
+          <p:nvPr/>
+        </p:nvSpPr>
+        <p:spPr>
+          <a:xfrm>
+            <a:off x="8866957" y="3192524"/>
+            <a:ext cx="269626" cy="184666"/>
+          </a:xfrm>
+          <a:prstGeom prst="rect">
+            <a:avLst/>
+          </a:prstGeom>
+          <a:noFill/>
+        </p:spPr>
+        <p:txBody>
+          <a:bodyPr wrap="none" rtlCol="0">
+            <a:spAutoFit/>
+          </a:bodyPr>
+          <a:lstStyle/>
+          <a:p>
+            <a:r>
+              <a:rPr lang="de-DE" sz="600" dirty="0"/>
+              <a:t>[7]</a:t>
+            </a:r>
+          </a:p>
+        </p:txBody>
+      </p:sp>
+      <p:sp>
+        <p:nvSpPr>
+          <p:cNvPr id="11" name="Textfeld 10">
+            <a:extLst>
+              <a:ext uri="{FF2B5EF4-FFF2-40B4-BE49-F238E27FC236}">
+                <a16:creationId xmlns:a16="http://schemas.microsoft.com/office/drawing/2014/main" id="{2B7E1AE3-9C3A-4C95-A636-E97C829F4D38}"/>
+              </a:ext>
+            </a:extLst>
+          </p:cNvPr>
+          <p:cNvSpPr txBox="1"/>
+          <p:nvPr/>
+        </p:nvSpPr>
+        <p:spPr>
+          <a:xfrm>
+            <a:off x="8844085" y="1999439"/>
+            <a:ext cx="269626" cy="184666"/>
+          </a:xfrm>
+          <a:prstGeom prst="rect">
+            <a:avLst/>
+          </a:prstGeom>
+          <a:noFill/>
+        </p:spPr>
+        <p:txBody>
+          <a:bodyPr wrap="none" rtlCol="0">
+            <a:spAutoFit/>
+          </a:bodyPr>
+          <a:lstStyle/>
+          <a:p>
+            <a:r>
+              <a:rPr lang="de-DE" sz="600" dirty="0"/>
+              <a:t>[6]</a:t>
+            </a:r>
+          </a:p>
+        </p:txBody>
+      </p:sp>
+      <mc:AlternateContent xmlns:mc="http://schemas.openxmlformats.org/markup-compatibility/2006">
+        <mc:Choice xmlns:a14="http://schemas.microsoft.com/office/drawing/2010/main" Requires="a14">
+          <p:sp>
+            <p:nvSpPr>
+              <p:cNvPr id="8" name="Textfeld 7">
+                <a:extLst>
+                  <a:ext uri="{FF2B5EF4-FFF2-40B4-BE49-F238E27FC236}">
+                    <a16:creationId xmlns:a16="http://schemas.microsoft.com/office/drawing/2014/main" id="{7B38C728-11FF-4148-8021-1BC55D4C894E}"/>
+                  </a:ext>
+                </a:extLst>
+              </p:cNvPr>
+              <p:cNvSpPr txBox="1"/>
+              <p:nvPr/>
+            </p:nvSpPr>
+            <p:spPr>
+              <a:xfrm>
+                <a:off x="7953137" y="2184105"/>
+                <a:ext cx="237244" cy="276999"/>
+              </a:xfrm>
+              <a:prstGeom prst="rect">
+                <a:avLst/>
+              </a:prstGeom>
+              <a:noFill/>
+            </p:spPr>
+            <p:txBody>
+              <a:bodyPr wrap="none" lIns="0" tIns="0" rIns="0" bIns="0" rtlCol="0">
+                <a:spAutoFit/>
+              </a:bodyPr>
+              <a:lstStyle/>
+              <a:p>
+                <a14:m>
+                  <m:oMathPara xmlns:m="http://schemas.openxmlformats.org/officeDocument/2006/math">
+                    <m:oMathParaPr>
+                      <m:jc m:val="centerGroup"/>
+                    </m:oMathParaPr>
+                    <m:oMath xmlns:m="http://schemas.openxmlformats.org/officeDocument/2006/math">
+                      <m:r>
+                        <a:rPr lang="de-DE" b="0" i="1" smtClean="0">
+                          <a:latin typeface="Cambria Math" panose="02040503050406030204" pitchFamily="18" charset="0"/>
+                        </a:rPr>
+                        <m:t>+</m:t>
+                      </m:r>
+                    </m:oMath>
+                  </m:oMathPara>
+                </a14:m>
+                <a:endParaRPr lang="de-DE" dirty="0"/>
+              </a:p>
+            </p:txBody>
+          </p:sp>
+        </mc:Choice>
+        <mc:Fallback>
+          <p:sp>
+            <p:nvSpPr>
+              <p:cNvPr id="8" name="Textfeld 7">
+                <a:extLst>
+                  <a:ext uri="{FF2B5EF4-FFF2-40B4-BE49-F238E27FC236}">
+                    <a16:creationId xmlns:a16="http://schemas.microsoft.com/office/drawing/2014/main" id="{7B38C728-11FF-4148-8021-1BC55D4C894E}"/>
+                  </a:ext>
+                </a:extLst>
+              </p:cNvPr>
+              <p:cNvSpPr txBox="1">
+                <a:spLocks noRot="1" noChangeAspect="1" noMove="1" noResize="1" noEditPoints="1" noAdjustHandles="1" noChangeArrowheads="1" noChangeShapeType="1" noTextEdit="1"/>
+              </p:cNvSpPr>
+              <p:nvPr/>
+            </p:nvSpPr>
+            <p:spPr>
+              <a:xfrm>
+                <a:off x="7953137" y="2184105"/>
+                <a:ext cx="237244" cy="276999"/>
+              </a:xfrm>
+              <a:prstGeom prst="rect">
+                <a:avLst/>
+              </a:prstGeom>
+              <a:blipFill>
+                <a:blip r:embed="rId4"/>
+                <a:stretch>
+                  <a:fillRect l="-20513" r="-15385" b="-8696"/>
+                </a:stretch>
+              </a:blipFill>
+            </p:spPr>
+            <p:txBody>
+              <a:bodyPr/>
+              <a:lstStyle/>
+              <a:p>
+                <a:r>
+                  <a:rPr lang="de-DE">
+                    <a:noFill/>
+                  </a:rPr>
+                  <a:t> </a:t>
+                </a:r>
+              </a:p>
+            </p:txBody>
+          </p:sp>
+        </mc:Fallback>
+      </mc:AlternateContent>
     </p:spTree>
   </p:cSld>
   <p:clrMapOvr>
@@ -4562,10 +5748,7 @@
           <a:bodyPr/>
           <a:lstStyle/>
           <a:p>
-            <a:pPr marL="285750" indent="-285750">
-              <a:buFont typeface="Wingdings" panose="05000000000000000000" pitchFamily="2" charset="2"/>
-              <a:buChar char="§"/>
-            </a:pPr>
+            <a:pPr marL="647700" lvl="2" indent="-285750"/>
             <a:r>
               <a:rPr lang="de-DE" dirty="0" err="1"/>
               <a:t>Javascript</a:t>
@@ -4576,30 +5759,21 @@
             </a:r>
           </a:p>
           <a:p>
-            <a:pPr marL="285750" indent="-285750">
-              <a:buFont typeface="Wingdings" panose="05000000000000000000" pitchFamily="2" charset="2"/>
-              <a:buChar char="§"/>
-            </a:pPr>
+            <a:pPr marL="647700" lvl="2" indent="-285750"/>
             <a:r>
               <a:rPr lang="de-DE" dirty="0"/>
               <a:t>Model-View-Controller Pattern</a:t>
             </a:r>
           </a:p>
           <a:p>
-            <a:pPr marL="285750" indent="-285750">
-              <a:buFont typeface="Wingdings" panose="05000000000000000000" pitchFamily="2" charset="2"/>
-              <a:buChar char="§"/>
-            </a:pPr>
+            <a:pPr marL="647700" lvl="2" indent="-285750"/>
             <a:r>
               <a:rPr lang="de-DE" dirty="0"/>
               <a:t>Plattformunabhängig</a:t>
             </a:r>
           </a:p>
           <a:p>
-            <a:pPr marL="285750" indent="-285750">
-              <a:buFont typeface="Wingdings" panose="05000000000000000000" pitchFamily="2" charset="2"/>
-              <a:buChar char="§"/>
-            </a:pPr>
+            <a:pPr marL="647700" lvl="2" indent="-285750"/>
             <a:r>
               <a:rPr lang="de-DE" dirty="0"/>
               <a:t>Reaktiv</a:t>
@@ -4611,6 +5785,233 @@
               <a:buChar char="§"/>
             </a:pPr>
             <a:endParaRPr lang="de-DE" dirty="0"/>
+          </a:p>
+        </p:txBody>
+      </p:sp>
+      <p:pic>
+        <p:nvPicPr>
+          <p:cNvPr id="4" name="Grafik 3">
+            <a:extLst>
+              <a:ext uri="{FF2B5EF4-FFF2-40B4-BE49-F238E27FC236}">
+                <a16:creationId xmlns:a16="http://schemas.microsoft.com/office/drawing/2014/main" id="{CCD98FD7-9609-4072-82A6-1224558306FD}"/>
+              </a:ext>
+            </a:extLst>
+          </p:cNvPr>
+          <p:cNvPicPr>
+            <a:picLocks noChangeAspect="1"/>
+          </p:cNvPicPr>
+          <p:nvPr/>
+        </p:nvPicPr>
+        <p:blipFill>
+          <a:blip r:embed="rId3">
+            <a:extLst>
+              <a:ext uri="{28A0092B-C50C-407E-A947-70E740481C1C}">
+                <a14:useLocalDpi xmlns:a14="http://schemas.microsoft.com/office/drawing/2010/main" val="0"/>
+              </a:ext>
+              <a:ext uri="{96DAC541-7B7A-43D3-8B79-37D633B846F1}">
+                <asvg:svgBlip xmlns:asvg="http://schemas.microsoft.com/office/drawing/2016/SVG/main" r:embed="rId4"/>
+              </a:ext>
+            </a:extLst>
+          </a:blip>
+          <a:stretch>
+            <a:fillRect/>
+          </a:stretch>
+        </p:blipFill>
+        <p:spPr>
+          <a:xfrm>
+            <a:off x="6833576" y="933823"/>
+            <a:ext cx="2153262" cy="2153262"/>
+          </a:xfrm>
+          <a:prstGeom prst="rect">
+            <a:avLst/>
+          </a:prstGeom>
+          <a:effectLst/>
+        </p:spPr>
+      </p:pic>
+      <p:sp>
+        <p:nvSpPr>
+          <p:cNvPr id="8" name="Textfeld 7">
+            <a:extLst>
+              <a:ext uri="{FF2B5EF4-FFF2-40B4-BE49-F238E27FC236}">
+                <a16:creationId xmlns:a16="http://schemas.microsoft.com/office/drawing/2014/main" id="{C3450863-A421-46D3-90EE-E0A072E46663}"/>
+              </a:ext>
+            </a:extLst>
+          </p:cNvPr>
+          <p:cNvSpPr txBox="1"/>
+          <p:nvPr/>
+        </p:nvSpPr>
+        <p:spPr>
+          <a:xfrm>
+            <a:off x="8672637" y="2983718"/>
+            <a:ext cx="269626" cy="184666"/>
+          </a:xfrm>
+          <a:prstGeom prst="rect">
+            <a:avLst/>
+          </a:prstGeom>
+          <a:noFill/>
+        </p:spPr>
+        <p:txBody>
+          <a:bodyPr wrap="none" rtlCol="0">
+            <a:spAutoFit/>
+          </a:bodyPr>
+          <a:lstStyle/>
+          <a:p>
+            <a:r>
+              <a:rPr lang="de-DE" sz="600" dirty="0"/>
+              <a:t>[8]</a:t>
+            </a:r>
+          </a:p>
+        </p:txBody>
+      </p:sp>
+      <p:pic>
+        <p:nvPicPr>
+          <p:cNvPr id="5" name="Grafik 4">
+            <a:extLst>
+              <a:ext uri="{FF2B5EF4-FFF2-40B4-BE49-F238E27FC236}">
+                <a16:creationId xmlns:a16="http://schemas.microsoft.com/office/drawing/2014/main" id="{0941C7C0-81E6-4376-8742-9836AD3777A7}"/>
+              </a:ext>
+            </a:extLst>
+          </p:cNvPr>
+          <p:cNvPicPr>
+            <a:picLocks noChangeAspect="1"/>
+          </p:cNvPicPr>
+          <p:nvPr/>
+        </p:nvPicPr>
+        <p:blipFill>
+          <a:blip r:embed="rId5"/>
+          <a:stretch>
+            <a:fillRect/>
+          </a:stretch>
+        </p:blipFill>
+        <p:spPr>
+          <a:xfrm>
+            <a:off x="5009294" y="2185343"/>
+            <a:ext cx="1824282" cy="3172481"/>
+          </a:xfrm>
+          <a:prstGeom prst="rect">
+            <a:avLst/>
+          </a:prstGeom>
+          <a:ln>
+            <a:noFill/>
+          </a:ln>
+          <a:effectLst>
+            <a:outerShdw blurRad="292100" dist="139700" dir="2700000" algn="tl" rotWithShape="0">
+              <a:srgbClr val="333333">
+                <a:alpha val="65000"/>
+              </a:srgbClr>
+            </a:outerShdw>
+            <a:reflection blurRad="6350" stA="52000" endA="300" endPos="35000" dir="5400000" sy="-100000" algn="bl" rotWithShape="0"/>
+          </a:effectLst>
+        </p:spPr>
+      </p:pic>
+      <p:pic>
+        <p:nvPicPr>
+          <p:cNvPr id="7" name="Grafik 6">
+            <a:extLst>
+              <a:ext uri="{FF2B5EF4-FFF2-40B4-BE49-F238E27FC236}">
+                <a16:creationId xmlns:a16="http://schemas.microsoft.com/office/drawing/2014/main" id="{79C6743B-778B-4B25-B52E-1DC3F5271E8C}"/>
+              </a:ext>
+            </a:extLst>
+          </p:cNvPr>
+          <p:cNvPicPr>
+            <a:picLocks noChangeAspect="1"/>
+          </p:cNvPicPr>
+          <p:nvPr/>
+        </p:nvPicPr>
+        <p:blipFill>
+          <a:blip r:embed="rId6"/>
+          <a:stretch>
+            <a:fillRect/>
+          </a:stretch>
+        </p:blipFill>
+        <p:spPr>
+          <a:xfrm>
+            <a:off x="252412" y="2461506"/>
+            <a:ext cx="4060380" cy="2879486"/>
+          </a:xfrm>
+          <a:prstGeom prst="rect">
+            <a:avLst/>
+          </a:prstGeom>
+          <a:ln>
+            <a:noFill/>
+          </a:ln>
+          <a:effectLst>
+            <a:outerShdw blurRad="292100" dist="139700" dir="2700000" algn="tl" rotWithShape="0">
+              <a:srgbClr val="333333">
+                <a:alpha val="65000"/>
+              </a:srgbClr>
+            </a:outerShdw>
+            <a:reflection blurRad="6350" stA="52000" endA="300" endPos="35000" dir="5400000" sy="-100000" algn="bl" rotWithShape="0"/>
+          </a:effectLst>
+        </p:spPr>
+      </p:pic>
+      <p:sp>
+        <p:nvSpPr>
+          <p:cNvPr id="12" name="Textfeld 11">
+            <a:extLst>
+              <a:ext uri="{FF2B5EF4-FFF2-40B4-BE49-F238E27FC236}">
+                <a16:creationId xmlns:a16="http://schemas.microsoft.com/office/drawing/2014/main" id="{143F1106-505A-45FF-AE86-A887493395C9}"/>
+              </a:ext>
+            </a:extLst>
+          </p:cNvPr>
+          <p:cNvSpPr txBox="1"/>
+          <p:nvPr/>
+        </p:nvSpPr>
+        <p:spPr>
+          <a:xfrm>
+            <a:off x="4312792" y="5357824"/>
+            <a:ext cx="312906" cy="184666"/>
+          </a:xfrm>
+          <a:prstGeom prst="rect">
+            <a:avLst/>
+          </a:prstGeom>
+          <a:noFill/>
+        </p:spPr>
+        <p:txBody>
+          <a:bodyPr wrap="none" rtlCol="0">
+            <a:spAutoFit/>
+          </a:bodyPr>
+          <a:lstStyle/>
+          <a:p>
+            <a:r>
+              <a:rPr lang="de-DE" sz="600" dirty="0"/>
+              <a:t>[10]</a:t>
+            </a:r>
+          </a:p>
+        </p:txBody>
+      </p:sp>
+      <p:sp>
+        <p:nvSpPr>
+          <p:cNvPr id="13" name="Textfeld 12">
+            <a:extLst>
+              <a:ext uri="{FF2B5EF4-FFF2-40B4-BE49-F238E27FC236}">
+                <a16:creationId xmlns:a16="http://schemas.microsoft.com/office/drawing/2014/main" id="{BA6E6566-DD4B-4C88-AE1E-9783DADB8021}"/>
+              </a:ext>
+            </a:extLst>
+          </p:cNvPr>
+          <p:cNvSpPr txBox="1"/>
+          <p:nvPr/>
+        </p:nvSpPr>
+        <p:spPr>
+          <a:xfrm>
+            <a:off x="6833576" y="5374656"/>
+            <a:ext cx="269626" cy="184666"/>
+          </a:xfrm>
+          <a:prstGeom prst="rect">
+            <a:avLst/>
+          </a:prstGeom>
+          <a:noFill/>
+        </p:spPr>
+        <p:txBody>
+          <a:bodyPr wrap="none" rtlCol="0">
+            <a:spAutoFit/>
+          </a:bodyPr>
+          <a:lstStyle/>
+          <a:p>
+            <a:r>
+              <a:rPr lang="de-DE" sz="600" dirty="0"/>
+              <a:t>[9]</a:t>
+            </a:r>
           </a:p>
         </p:txBody>
       </p:sp>
@@ -4718,10 +6119,7 @@
           <a:bodyPr/>
           <a:lstStyle/>
           <a:p>
-            <a:pPr marL="285750" indent="-285750">
-              <a:buFont typeface="Wingdings" panose="05000000000000000000" pitchFamily="2" charset="2"/>
-              <a:buChar char="§"/>
-            </a:pPr>
+            <a:pPr marL="647700" lvl="2" indent="-285750"/>
             <a:r>
               <a:rPr lang="de-DE" dirty="0" err="1"/>
               <a:t>NoSQL</a:t>
@@ -4732,53 +6130,194 @@
             </a:r>
           </a:p>
           <a:p>
-            <a:pPr marL="285750" indent="-285750">
-              <a:buFont typeface="Wingdings" panose="05000000000000000000" pitchFamily="2" charset="2"/>
-              <a:buChar char="§"/>
-            </a:pPr>
+            <a:pPr marL="647700" lvl="2" indent="-285750"/>
             <a:r>
               <a:rPr lang="de-DE" dirty="0"/>
               <a:t>Dokumentbasiert (JSON-Formate)</a:t>
             </a:r>
           </a:p>
           <a:p>
-            <a:pPr marL="285750" indent="-285750">
-              <a:buFont typeface="Wingdings" panose="05000000000000000000" pitchFamily="2" charset="2"/>
-              <a:buChar char="§"/>
-            </a:pPr>
+            <a:pPr marL="647700" lvl="2" indent="-285750"/>
             <a:r>
               <a:rPr lang="de-DE" dirty="0"/>
               <a:t>Skalierbarkeit</a:t>
             </a:r>
           </a:p>
           <a:p>
-            <a:pPr marL="285750" indent="-285750">
-              <a:buFont typeface="Wingdings" panose="05000000000000000000" pitchFamily="2" charset="2"/>
-              <a:buChar char="§"/>
-            </a:pPr>
+            <a:pPr marL="647700" lvl="2" indent="-285750"/>
             <a:r>
               <a:rPr lang="de-DE" dirty="0"/>
               <a:t>Gute Meteor-Integration</a:t>
             </a:r>
           </a:p>
           <a:p>
-            <a:pPr marL="285750" indent="-285750">
-              <a:buFont typeface="Wingdings" panose="05000000000000000000" pitchFamily="2" charset="2"/>
-              <a:buChar char="§"/>
-            </a:pPr>
+            <a:pPr marL="647700" lvl="2" indent="-285750"/>
             <a:r>
               <a:rPr lang="de-DE" dirty="0"/>
               <a:t>Keine Datenkonventionen</a:t>
             </a:r>
           </a:p>
           <a:p>
-            <a:pPr marL="285750" indent="-285750">
-              <a:buFont typeface="Wingdings" panose="05000000000000000000" pitchFamily="2" charset="2"/>
-              <a:buChar char="§"/>
-            </a:pPr>
+            <a:pPr marL="647700" lvl="2" indent="-285750"/>
             <a:r>
               <a:rPr lang="de-DE" dirty="0"/>
               <a:t>Perfekt für abweichende Datensätze</a:t>
+            </a:r>
+          </a:p>
+        </p:txBody>
+      </p:sp>
+      <p:pic>
+        <p:nvPicPr>
+          <p:cNvPr id="6146" name="Picture 2" descr="https://webassets.mongodb.com/_com_assets/global/mongodb-logo-white.png">
+            <a:extLst>
+              <a:ext uri="{FF2B5EF4-FFF2-40B4-BE49-F238E27FC236}">
+                <a16:creationId xmlns:a16="http://schemas.microsoft.com/office/drawing/2014/main" id="{4F0185EE-6369-4478-8542-2684249F8F6B}"/>
+              </a:ext>
+            </a:extLst>
+          </p:cNvPr>
+          <p:cNvPicPr>
+            <a:picLocks noChangeAspect="1" noChangeArrowheads="1"/>
+          </p:cNvPicPr>
+          <p:nvPr/>
+        </p:nvPicPr>
+        <p:blipFill>
+          <a:blip r:embed="rId3" cstate="print">
+            <a:extLst>
+              <a:ext uri="{BEBA8EAE-BF5A-486C-A8C5-ECC9F3942E4B}">
+                <a14:imgProps xmlns:a14="http://schemas.microsoft.com/office/drawing/2010/main">
+                  <a14:imgLayer r:embed="rId4">
+                    <a14:imgEffect>
+                      <a14:brightnessContrast bright="-20000" contrast="-20000"/>
+                    </a14:imgEffect>
+                  </a14:imgLayer>
+                </a14:imgProps>
+              </a:ext>
+              <a:ext uri="{28A0092B-C50C-407E-A947-70E740481C1C}">
+                <a14:useLocalDpi xmlns:a14="http://schemas.microsoft.com/office/drawing/2010/main" val="0"/>
+              </a:ext>
+            </a:extLst>
+          </a:blip>
+          <a:srcRect/>
+          <a:stretch>
+            <a:fillRect/>
+          </a:stretch>
+        </p:blipFill>
+        <p:spPr bwMode="auto">
+          <a:xfrm>
+            <a:off x="5475254" y="989799"/>
+            <a:ext cx="3511584" cy="954102"/>
+          </a:xfrm>
+          <a:prstGeom prst="rect">
+            <a:avLst/>
+          </a:prstGeom>
+          <a:noFill/>
+          <a:extLst>
+            <a:ext uri="{909E8E84-426E-40DD-AFC4-6F175D3DCCD1}">
+              <a14:hiddenFill xmlns:a14="http://schemas.microsoft.com/office/drawing/2010/main">
+                <a:solidFill>
+                  <a:srgbClr val="FFFFFF"/>
+                </a:solidFill>
+              </a14:hiddenFill>
+            </a:ext>
+          </a:extLst>
+        </p:spPr>
+      </p:pic>
+      <p:sp>
+        <p:nvSpPr>
+          <p:cNvPr id="6" name="Textfeld 5">
+            <a:extLst>
+              <a:ext uri="{FF2B5EF4-FFF2-40B4-BE49-F238E27FC236}">
+                <a16:creationId xmlns:a16="http://schemas.microsoft.com/office/drawing/2014/main" id="{606F04BA-23B9-446B-84EF-E314B37E9B63}"/>
+              </a:ext>
+            </a:extLst>
+          </p:cNvPr>
+          <p:cNvSpPr txBox="1"/>
+          <p:nvPr/>
+        </p:nvSpPr>
+        <p:spPr>
+          <a:xfrm>
+            <a:off x="8807450" y="1851568"/>
+            <a:ext cx="312906" cy="184666"/>
+          </a:xfrm>
+          <a:prstGeom prst="rect">
+            <a:avLst/>
+          </a:prstGeom>
+          <a:noFill/>
+        </p:spPr>
+        <p:txBody>
+          <a:bodyPr wrap="none" rtlCol="0">
+            <a:spAutoFit/>
+          </a:bodyPr>
+          <a:lstStyle/>
+          <a:p>
+            <a:r>
+              <a:rPr lang="de-DE" sz="600" dirty="0"/>
+              <a:t>[11]</a:t>
+            </a:r>
+          </a:p>
+        </p:txBody>
+      </p:sp>
+      <p:pic>
+        <p:nvPicPr>
+          <p:cNvPr id="3" name="Grafik 2">
+            <a:extLst>
+              <a:ext uri="{FF2B5EF4-FFF2-40B4-BE49-F238E27FC236}">
+                <a16:creationId xmlns:a16="http://schemas.microsoft.com/office/drawing/2014/main" id="{F313F848-E20D-46AA-BE5D-C931D6999235}"/>
+              </a:ext>
+            </a:extLst>
+          </p:cNvPr>
+          <p:cNvPicPr>
+            <a:picLocks noChangeAspect="1"/>
+          </p:cNvPicPr>
+          <p:nvPr/>
+        </p:nvPicPr>
+        <p:blipFill>
+          <a:blip r:embed="rId5"/>
+          <a:stretch>
+            <a:fillRect/>
+          </a:stretch>
+        </p:blipFill>
+        <p:spPr>
+          <a:xfrm>
+            <a:off x="6268264" y="2323751"/>
+            <a:ext cx="1925564" cy="3315580"/>
+          </a:xfrm>
+          <a:prstGeom prst="rect">
+            <a:avLst/>
+          </a:prstGeom>
+        </p:spPr>
+      </p:pic>
+      <p:sp>
+        <p:nvSpPr>
+          <p:cNvPr id="9" name="Textfeld 8">
+            <a:extLst>
+              <a:ext uri="{FF2B5EF4-FFF2-40B4-BE49-F238E27FC236}">
+                <a16:creationId xmlns:a16="http://schemas.microsoft.com/office/drawing/2014/main" id="{C98D3B8B-1F4D-4248-8AB9-D9DB1304A930}"/>
+              </a:ext>
+            </a:extLst>
+          </p:cNvPr>
+          <p:cNvSpPr txBox="1"/>
+          <p:nvPr/>
+        </p:nvSpPr>
+        <p:spPr>
+          <a:xfrm>
+            <a:off x="8203740" y="5546998"/>
+            <a:ext cx="312906" cy="184666"/>
+          </a:xfrm>
+          <a:prstGeom prst="rect">
+            <a:avLst/>
+          </a:prstGeom>
+          <a:noFill/>
+        </p:spPr>
+        <p:txBody>
+          <a:bodyPr wrap="none" rtlCol="0">
+            <a:spAutoFit/>
+          </a:bodyPr>
+          <a:lstStyle/>
+          <a:p>
+            <a:r>
+              <a:rPr lang="de-DE" sz="600" dirty="0"/>
+              <a:t>[12]</a:t>
             </a:r>
           </a:p>
         </p:txBody>

</xml_diff>